<commit_message>
Updating the task 3 presentation
</commit_message>
<xml_diff>
--- a/Documentation/Presentations/Task3.pptx
+++ b/Documentation/Presentations/Task3.pptx
@@ -4313,16 +4313,14 @@
       </p:grpSpPr>
       <p:pic>
         <p:nvPicPr>
-          <p:cNvPr id="2" name="Grafik 1">
+          <p:cNvPr id="3" name="Grafik 2">
             <a:extLst>
               <a:ext uri="{FF2B5EF4-FFF2-40B4-BE49-F238E27FC236}">
-                <a16:creationId xmlns:a16="http://schemas.microsoft.com/office/drawing/2014/main" id="{BCE57006-759C-40BB-B0EB-895CAD2B4FE0}"/>
+                <a16:creationId xmlns:a16="http://schemas.microsoft.com/office/drawing/2014/main" id="{9AF4817C-C8E9-41B3-8F8E-B9D869853B8F}"/>
               </a:ext>
             </a:extLst>
           </p:cNvPr>
-          <p:cNvPicPr>
-            <a:picLocks noChangeAspect="1"/>
-          </p:cNvPicPr>
+          <p:cNvPicPr/>
           <p:nvPr/>
         </p:nvPicPr>
         <p:blipFill>
@@ -4333,14 +4331,47 @@
         </p:blipFill>
         <p:spPr>
           <a:xfrm>
-            <a:off x="130965" y="485082"/>
-            <a:ext cx="11429089" cy="5451460"/>
+            <a:off x="1132316" y="1730280"/>
+            <a:ext cx="9490287" cy="4116043"/>
           </a:xfrm>
           <a:prstGeom prst="rect">
             <a:avLst/>
           </a:prstGeom>
         </p:spPr>
       </p:pic>
+      <p:sp>
+        <p:nvSpPr>
+          <p:cNvPr id="4" name="Titel 1">
+            <a:extLst>
+              <a:ext uri="{FF2B5EF4-FFF2-40B4-BE49-F238E27FC236}">
+                <a16:creationId xmlns:a16="http://schemas.microsoft.com/office/drawing/2014/main" id="{15CB5699-7547-4570-8960-B5BCADA0A5E7}"/>
+              </a:ext>
+            </a:extLst>
+          </p:cNvPr>
+          <p:cNvSpPr>
+            <a:spLocks noGrp="1"/>
+          </p:cNvSpPr>
+          <p:nvPr>
+            <p:ph type="title"/>
+          </p:nvPr>
+        </p:nvSpPr>
+        <p:spPr>
+          <a:xfrm>
+            <a:off x="1097280" y="192335"/>
+            <a:ext cx="10058400" cy="1450757"/>
+          </a:xfrm>
+        </p:spPr>
+        <p:txBody>
+          <a:bodyPr/>
+          <a:lstStyle/>
+          <a:p>
+            <a:r>
+              <a:rPr lang="de-CH" dirty="0"/>
+              <a:t>Fachklassendiagramm</a:t>
+            </a:r>
+          </a:p>
+        </p:txBody>
+      </p:sp>
     </p:spTree>
     <p:extLst>
       <p:ext uri="{BB962C8B-B14F-4D97-AF65-F5344CB8AC3E}">
@@ -4398,7 +4429,7 @@
           <a:lstStyle/>
           <a:p>
             <a:r>
-              <a:rPr lang="de-CH"/>
+              <a:rPr lang="de-CH" dirty="0"/>
               <a:t>Zustandsmodell</a:t>
             </a:r>
           </a:p>

</xml_diff>